<commit_message>
Test for Klasse gemacht
</commit_message>
<xml_diff>
--- a/SchulungsUnterlagen/BZU/162_Einführung_Grundlagen_01.pptx
+++ b/SchulungsUnterlagen/BZU/162_Einführung_Grundlagen_01.pptx
@@ -284,7 +284,7 @@
           <a:p>
             <a:fld id="{1D8BD707-D9CF-40AE-B4C6-C98DA3205C09}" type="datetimeFigureOut">
               <a:rPr lang="en-US"/>
-              <a:t>9/2/2021</a:t>
+              <a:t>9/24/2021</a:t>
             </a:fld>
             <a:endParaRPr lang="en-US"/>
           </a:p>
@@ -483,7 +483,7 @@
           <a:p>
             <a:fld id="{1D8BD707-D9CF-40AE-B4C6-C98DA3205C09}" type="datetimeFigureOut">
               <a:rPr lang="en-US"/>
-              <a:t>9/2/2021</a:t>
+              <a:t>9/24/2021</a:t>
             </a:fld>
             <a:endParaRPr lang="en-US"/>
           </a:p>
@@ -719,7 +719,7 @@
           <a:p>
             <a:fld id="{1D8BD707-D9CF-40AE-B4C6-C98DA3205C09}" type="datetimeFigureOut">
               <a:rPr lang="en-US"/>
-              <a:t>9/2/2021</a:t>
+              <a:t>9/24/2021</a:t>
             </a:fld>
             <a:endParaRPr lang="en-US"/>
           </a:p>
@@ -1860,7 +1860,7 @@
           <a:p>
             <a:fld id="{1D8BD707-D9CF-40AE-B4C6-C98DA3205C09}" type="datetimeFigureOut">
               <a:rPr lang="en-US"/>
-              <a:t>9/2/2021</a:t>
+              <a:t>9/24/2021</a:t>
             </a:fld>
             <a:endParaRPr lang="en-US"/>
           </a:p>
@@ -2001,7 +2001,7 @@
           <a:p>
             <a:fld id="{1D8BD707-D9CF-40AE-B4C6-C98DA3205C09}" type="datetimeFigureOut">
               <a:rPr lang="en-US"/>
-              <a:t>9/2/2021</a:t>
+              <a:t>9/24/2021</a:t>
             </a:fld>
             <a:endParaRPr lang="en-US"/>
           </a:p>
@@ -3182,7 +3182,7 @@
           <a:p>
             <a:fld id="{1D8BD707-D9CF-40AE-B4C6-C98DA3205C09}" type="datetimeFigureOut">
               <a:rPr lang="en-US"/>
-              <a:t>9/2/2021</a:t>
+              <a:t>9/24/2021</a:t>
             </a:fld>
             <a:endParaRPr lang="en-US"/>
           </a:p>
@@ -10908,7 +10908,7 @@
         <p:spPr>
           <a:xfrm>
             <a:off x="1840282" y="8926153"/>
-            <a:ext cx="14374384" cy="523220"/>
+            <a:ext cx="16060807" cy="523220"/>
           </a:xfrm>
           <a:prstGeom prst="rect">
             <a:avLst/>
@@ -10927,7 +10927,15 @@
             </a:r>
             <a:r>
               <a:rPr lang="de-CH" sz="2800" dirty="0" smtClean="0"/>
-              <a:t>Uster, 13°,… können in Form von Nachrichten gespeichert, verarbeitet und verteilt werden </a:t>
+              <a:t>Uster, 13</a:t>
+            </a:r>
+            <a:r>
+              <a:rPr lang="de-CH" sz="2800" dirty="0" smtClean="0"/>
+              <a:t>°, regnerisch… </a:t>
+            </a:r>
+            <a:r>
+              <a:rPr lang="de-CH" sz="2800" dirty="0" smtClean="0"/>
+              <a:t>können in Form von Nachrichten gespeichert, verarbeitet und verteilt werden </a:t>
             </a:r>
             <a:endParaRPr lang="de-CH" sz="2800" dirty="0"/>
           </a:p>
@@ -11517,7 +11525,6 @@
               <a:rPr lang="de-CH" sz="4400" dirty="0" smtClean="0"/>
               <a:t>Franz;Bernhard;8854;Siebnen</a:t>
             </a:r>
-            <a:endParaRPr lang="de-CH" sz="4400" dirty="0" smtClean="0"/>
           </a:p>
         </p:txBody>
       </p:sp>
@@ -11568,7 +11575,6 @@
               <a:rPr lang="de-CH" sz="4400" dirty="0" smtClean="0"/>
               <a:t>Franz;Bernhard;8854;Siebnen</a:t>
             </a:r>
-            <a:endParaRPr lang="de-CH" sz="4400" dirty="0" smtClean="0"/>
           </a:p>
         </p:txBody>
       </p:sp>
@@ -13106,15 +13112,7 @@
                   <a:srgbClr val="FF0000"/>
                 </a:solidFill>
               </a:rPr>
-              <a:t>/ ASCII, </a:t>
-            </a:r>
-            <a:r>
-              <a:rPr lang="de-CH" sz="3200" dirty="0" smtClean="0">
-                <a:solidFill>
-                  <a:srgbClr val="FF0000"/>
-                </a:solidFill>
-              </a:rPr>
-              <a:t>Unicode</a:t>
+              <a:t>/ ASCII, Unicode</a:t>
             </a:r>
             <a:endParaRPr lang="de-CH" sz="3200" dirty="0">
               <a:solidFill>

</xml_diff>